<commit_message>
Moved Campaign to be after Character
</commit_message>
<xml_diff>
--- a/Res/Capstone_Presentation.pptx
+++ b/Res/Capstone_Presentation.pptx
@@ -15,8 +15,8 @@
     <p:sldId id="260" r:id="rId6"/>
     <p:sldId id="261" r:id="rId7"/>
     <p:sldId id="262" r:id="rId8"/>
-    <p:sldId id="263" r:id="rId9"/>
-    <p:sldId id="264" r:id="rId10"/>
+    <p:sldId id="264" r:id="rId9"/>
+    <p:sldId id="263" r:id="rId10"/>
     <p:sldId id="265" r:id="rId11"/>
     <p:sldId id="256" r:id="rId12"/>
   </p:sldIdLst>
@@ -7866,6 +7866,154 @@
           <p:cNvPr id="2" name="Title 1">
             <a:extLst>
               <a:ext uri="{FF2B5EF4-FFF2-40B4-BE49-F238E27FC236}">
+                <a16:creationId xmlns:a16="http://schemas.microsoft.com/office/drawing/2014/main" id="{C3E3120C-2B7A-43B2-9967-7929E8CC6863}"/>
+              </a:ext>
+            </a:extLst>
+          </p:cNvPr>
+          <p:cNvSpPr>
+            <a:spLocks noGrp="1"/>
+          </p:cNvSpPr>
+          <p:nvPr>
+            <p:ph type="title"/>
+          </p:nvPr>
+        </p:nvSpPr>
+        <p:spPr/>
+        <p:txBody>
+          <a:bodyPr/>
+          <a:lstStyle/>
+          <a:p>
+            <a:pPr algn="ctr"/>
+            <a:r>
+              <a:rPr lang="en-US" b="1" u="sng" dirty="0"/>
+              <a:t>Character page</a:t>
+            </a:r>
+          </a:p>
+        </p:txBody>
+      </p:sp>
+      <p:pic>
+        <p:nvPicPr>
+          <p:cNvPr id="5" name="Content Placeholder 4">
+            <a:extLst>
+              <a:ext uri="{FF2B5EF4-FFF2-40B4-BE49-F238E27FC236}">
+                <a16:creationId xmlns:a16="http://schemas.microsoft.com/office/drawing/2014/main" id="{A1914452-FDE5-4A9A-BEF8-ABD23CFAB64F}"/>
+              </a:ext>
+            </a:extLst>
+          </p:cNvPr>
+          <p:cNvPicPr>
+            <a:picLocks noGrp="1" noChangeAspect="1"/>
+          </p:cNvPicPr>
+          <p:nvPr>
+            <p:ph idx="1"/>
+          </p:nvPr>
+        </p:nvPicPr>
+        <p:blipFill>
+          <a:blip r:embed="rId2"/>
+          <a:stretch>
+            <a:fillRect/>
+          </a:stretch>
+        </p:blipFill>
+        <p:spPr>
+          <a:xfrm>
+            <a:off x="1003523" y="2141379"/>
+            <a:ext cx="3400820" cy="2244045"/>
+          </a:xfrm>
+        </p:spPr>
+      </p:pic>
+      <p:pic>
+        <p:nvPicPr>
+          <p:cNvPr id="7" name="Picture 6">
+            <a:extLst>
+              <a:ext uri="{FF2B5EF4-FFF2-40B4-BE49-F238E27FC236}">
+                <a16:creationId xmlns:a16="http://schemas.microsoft.com/office/drawing/2014/main" id="{0A198692-7E14-42D8-8B43-D7DA72F4A82A}"/>
+              </a:ext>
+            </a:extLst>
+          </p:cNvPr>
+          <p:cNvPicPr>
+            <a:picLocks noChangeAspect="1"/>
+          </p:cNvPicPr>
+          <p:nvPr/>
+        </p:nvPicPr>
+        <p:blipFill>
+          <a:blip r:embed="rId3"/>
+          <a:stretch>
+            <a:fillRect/>
+          </a:stretch>
+        </p:blipFill>
+        <p:spPr>
+          <a:xfrm>
+            <a:off x="6966299" y="2118733"/>
+            <a:ext cx="4222178" cy="1672794"/>
+          </a:xfrm>
+          <a:prstGeom prst="rect">
+            <a:avLst/>
+          </a:prstGeom>
+        </p:spPr>
+      </p:pic>
+      <p:pic>
+        <p:nvPicPr>
+          <p:cNvPr id="9" name="Picture 8">
+            <a:extLst>
+              <a:ext uri="{FF2B5EF4-FFF2-40B4-BE49-F238E27FC236}">
+                <a16:creationId xmlns:a16="http://schemas.microsoft.com/office/drawing/2014/main" id="{9B644484-3BEB-491A-9F11-E17D830E5D50}"/>
+              </a:ext>
+            </a:extLst>
+          </p:cNvPr>
+          <p:cNvPicPr>
+            <a:picLocks noChangeAspect="1"/>
+          </p:cNvPicPr>
+          <p:nvPr/>
+        </p:nvPicPr>
+        <p:blipFill>
+          <a:blip r:embed="rId4"/>
+          <a:stretch>
+            <a:fillRect/>
+          </a:stretch>
+        </p:blipFill>
+        <p:spPr>
+          <a:xfrm>
+            <a:off x="4514071" y="3873823"/>
+            <a:ext cx="3700208" cy="2456873"/>
+          </a:xfrm>
+          <a:prstGeom prst="rect">
+            <a:avLst/>
+          </a:prstGeom>
+        </p:spPr>
+      </p:pic>
+    </p:spTree>
+    <p:extLst>
+      <p:ext uri="{BB962C8B-B14F-4D97-AF65-F5344CB8AC3E}">
+        <p14:creationId xmlns:p14="http://schemas.microsoft.com/office/powerpoint/2010/main" val="2505402052"/>
+      </p:ext>
+    </p:extLst>
+  </p:cSld>
+  <p:clrMapOvr>
+    <a:masterClrMapping/>
+  </p:clrMapOvr>
+</p:sld>
+</file>
+
+<file path=ppt/slides/slide9.xml><?xml version="1.0" encoding="utf-8"?>
+<p:sld xmlns:a="http://schemas.openxmlformats.org/drawingml/2006/main" xmlns:r="http://schemas.openxmlformats.org/officeDocument/2006/relationships" xmlns:p="http://schemas.openxmlformats.org/presentationml/2006/main">
+  <p:cSld>
+    <p:spTree>
+      <p:nvGrpSpPr>
+        <p:cNvPr id="1" name=""/>
+        <p:cNvGrpSpPr/>
+        <p:nvPr/>
+      </p:nvGrpSpPr>
+      <p:grpSpPr>
+        <a:xfrm>
+          <a:off x="0" y="0"/>
+          <a:ext cx="0" cy="0"/>
+          <a:chOff x="0" y="0"/>
+          <a:chExt cx="0" cy="0"/>
+        </a:xfrm>
+      </p:grpSpPr>
+      <p:sp>
+        <p:nvSpPr>
+          <p:cNvPr id="2" name="Title 1">
+            <a:extLst>
+              <a:ext uri="{FF2B5EF4-FFF2-40B4-BE49-F238E27FC236}">
                 <a16:creationId xmlns:a16="http://schemas.microsoft.com/office/drawing/2014/main" id="{EF3D9749-E984-4E32-A38F-EC26D3BF44FE}"/>
               </a:ext>
             </a:extLst>
@@ -7983,154 +8131,6 @@
     <p:extLst>
       <p:ext uri="{BB962C8B-B14F-4D97-AF65-F5344CB8AC3E}">
         <p14:creationId xmlns:p14="http://schemas.microsoft.com/office/powerpoint/2010/main" val="2278381639"/>
-      </p:ext>
-    </p:extLst>
-  </p:cSld>
-  <p:clrMapOvr>
-    <a:masterClrMapping/>
-  </p:clrMapOvr>
-</p:sld>
-</file>
-
-<file path=ppt/slides/slide9.xml><?xml version="1.0" encoding="utf-8"?>
-<p:sld xmlns:a="http://schemas.openxmlformats.org/drawingml/2006/main" xmlns:r="http://schemas.openxmlformats.org/officeDocument/2006/relationships" xmlns:p="http://schemas.openxmlformats.org/presentationml/2006/main">
-  <p:cSld>
-    <p:spTree>
-      <p:nvGrpSpPr>
-        <p:cNvPr id="1" name=""/>
-        <p:cNvGrpSpPr/>
-        <p:nvPr/>
-      </p:nvGrpSpPr>
-      <p:grpSpPr>
-        <a:xfrm>
-          <a:off x="0" y="0"/>
-          <a:ext cx="0" cy="0"/>
-          <a:chOff x="0" y="0"/>
-          <a:chExt cx="0" cy="0"/>
-        </a:xfrm>
-      </p:grpSpPr>
-      <p:sp>
-        <p:nvSpPr>
-          <p:cNvPr id="2" name="Title 1">
-            <a:extLst>
-              <a:ext uri="{FF2B5EF4-FFF2-40B4-BE49-F238E27FC236}">
-                <a16:creationId xmlns:a16="http://schemas.microsoft.com/office/drawing/2014/main" id="{C3E3120C-2B7A-43B2-9967-7929E8CC6863}"/>
-              </a:ext>
-            </a:extLst>
-          </p:cNvPr>
-          <p:cNvSpPr>
-            <a:spLocks noGrp="1"/>
-          </p:cNvSpPr>
-          <p:nvPr>
-            <p:ph type="title"/>
-          </p:nvPr>
-        </p:nvSpPr>
-        <p:spPr/>
-        <p:txBody>
-          <a:bodyPr/>
-          <a:lstStyle/>
-          <a:p>
-            <a:pPr algn="ctr"/>
-            <a:r>
-              <a:rPr lang="en-US" b="1" u="sng" dirty="0"/>
-              <a:t>Character page</a:t>
-            </a:r>
-          </a:p>
-        </p:txBody>
-      </p:sp>
-      <p:pic>
-        <p:nvPicPr>
-          <p:cNvPr id="5" name="Content Placeholder 4">
-            <a:extLst>
-              <a:ext uri="{FF2B5EF4-FFF2-40B4-BE49-F238E27FC236}">
-                <a16:creationId xmlns:a16="http://schemas.microsoft.com/office/drawing/2014/main" id="{A1914452-FDE5-4A9A-BEF8-ABD23CFAB64F}"/>
-              </a:ext>
-            </a:extLst>
-          </p:cNvPr>
-          <p:cNvPicPr>
-            <a:picLocks noGrp="1" noChangeAspect="1"/>
-          </p:cNvPicPr>
-          <p:nvPr>
-            <p:ph idx="1"/>
-          </p:nvPr>
-        </p:nvPicPr>
-        <p:blipFill>
-          <a:blip r:embed="rId2"/>
-          <a:stretch>
-            <a:fillRect/>
-          </a:stretch>
-        </p:blipFill>
-        <p:spPr>
-          <a:xfrm>
-            <a:off x="1003523" y="2141379"/>
-            <a:ext cx="3400820" cy="2244045"/>
-          </a:xfrm>
-        </p:spPr>
-      </p:pic>
-      <p:pic>
-        <p:nvPicPr>
-          <p:cNvPr id="7" name="Picture 6">
-            <a:extLst>
-              <a:ext uri="{FF2B5EF4-FFF2-40B4-BE49-F238E27FC236}">
-                <a16:creationId xmlns:a16="http://schemas.microsoft.com/office/drawing/2014/main" id="{0A198692-7E14-42D8-8B43-D7DA72F4A82A}"/>
-              </a:ext>
-            </a:extLst>
-          </p:cNvPr>
-          <p:cNvPicPr>
-            <a:picLocks noChangeAspect="1"/>
-          </p:cNvPicPr>
-          <p:nvPr/>
-        </p:nvPicPr>
-        <p:blipFill>
-          <a:blip r:embed="rId3"/>
-          <a:stretch>
-            <a:fillRect/>
-          </a:stretch>
-        </p:blipFill>
-        <p:spPr>
-          <a:xfrm>
-            <a:off x="6966299" y="2118733"/>
-            <a:ext cx="4222178" cy="1672794"/>
-          </a:xfrm>
-          <a:prstGeom prst="rect">
-            <a:avLst/>
-          </a:prstGeom>
-        </p:spPr>
-      </p:pic>
-      <p:pic>
-        <p:nvPicPr>
-          <p:cNvPr id="9" name="Picture 8">
-            <a:extLst>
-              <a:ext uri="{FF2B5EF4-FFF2-40B4-BE49-F238E27FC236}">
-                <a16:creationId xmlns:a16="http://schemas.microsoft.com/office/drawing/2014/main" id="{9B644484-3BEB-491A-9F11-E17D830E5D50}"/>
-              </a:ext>
-            </a:extLst>
-          </p:cNvPr>
-          <p:cNvPicPr>
-            <a:picLocks noChangeAspect="1"/>
-          </p:cNvPicPr>
-          <p:nvPr/>
-        </p:nvPicPr>
-        <p:blipFill>
-          <a:blip r:embed="rId4"/>
-          <a:stretch>
-            <a:fillRect/>
-          </a:stretch>
-        </p:blipFill>
-        <p:spPr>
-          <a:xfrm>
-            <a:off x="4514071" y="3873823"/>
-            <a:ext cx="3700208" cy="2456873"/>
-          </a:xfrm>
-          <a:prstGeom prst="rect">
-            <a:avLst/>
-          </a:prstGeom>
-        </p:spPr>
-      </p:pic>
-    </p:spTree>
-    <p:extLst>
-      <p:ext uri="{BB962C8B-B14F-4D97-AF65-F5344CB8AC3E}">
-        <p14:creationId xmlns:p14="http://schemas.microsoft.com/office/powerpoint/2010/main" val="2505402052"/>
       </p:ext>
     </p:extLst>
   </p:cSld>

</xml_diff>